<commit_message>
specific use case (in progress) 3
</commit_message>
<xml_diff>
--- a/documentation/docTravail/seancesTravail/Role4All_use_case/RoleModel.pptx
+++ b/documentation/docTravail/seancesTravail/Role4All_use_case/RoleModel.pptx
@@ -286,9 +286,9 @@
           <a:bodyPr/>
           <a:lstStyle/>
           <a:p>
-            <a:fld id="{21750E80-A8F1-4F3A-B283-04984F056DAD}" type="datetimeFigureOut">
+            <a:fld id="{3CB46692-9727-46A0-A109-6F804C3C5B15}" type="datetimeFigureOut">
               <a:rPr lang="en-US" smtClean="0"/>
-              <a:t>1/11/2016</a:t>
+              <a:t>1/12/2016</a:t>
             </a:fld>
             <a:endParaRPr lang="en-US"/>
           </a:p>
@@ -328,7 +328,7 @@
           <a:bodyPr/>
           <a:lstStyle/>
           <a:p>
-            <a:fld id="{FDE6D831-7137-42F3-9A80-B0E8AA80523A}" type="slidenum">
+            <a:fld id="{432F7E23-9FC9-4871-B463-EE63CBC64C8F}" type="slidenum">
               <a:rPr lang="en-US" smtClean="0"/>
               <a:t>‹N°›</a:t>
             </a:fld>
@@ -339,7 +339,7 @@
     </p:spTree>
     <p:extLst>
       <p:ext uri="{BB962C8B-B14F-4D97-AF65-F5344CB8AC3E}">
-        <p14:creationId xmlns:p14="http://schemas.microsoft.com/office/powerpoint/2010/main" val="3188515016"/>
+        <p14:creationId xmlns:p14="http://schemas.microsoft.com/office/powerpoint/2010/main" val="2337535938"/>
       </p:ext>
     </p:extLst>
   </p:cSld>
@@ -456,9 +456,9 @@
           <a:bodyPr/>
           <a:lstStyle/>
           <a:p>
-            <a:fld id="{21750E80-A8F1-4F3A-B283-04984F056DAD}" type="datetimeFigureOut">
+            <a:fld id="{3CB46692-9727-46A0-A109-6F804C3C5B15}" type="datetimeFigureOut">
               <a:rPr lang="en-US" smtClean="0"/>
-              <a:t>1/11/2016</a:t>
+              <a:t>1/12/2016</a:t>
             </a:fld>
             <a:endParaRPr lang="en-US"/>
           </a:p>
@@ -498,7 +498,7 @@
           <a:bodyPr/>
           <a:lstStyle/>
           <a:p>
-            <a:fld id="{FDE6D831-7137-42F3-9A80-B0E8AA80523A}" type="slidenum">
+            <a:fld id="{432F7E23-9FC9-4871-B463-EE63CBC64C8F}" type="slidenum">
               <a:rPr lang="en-US" smtClean="0"/>
               <a:t>‹N°›</a:t>
             </a:fld>
@@ -509,7 +509,7 @@
     </p:spTree>
     <p:extLst>
       <p:ext uri="{BB962C8B-B14F-4D97-AF65-F5344CB8AC3E}">
-        <p14:creationId xmlns:p14="http://schemas.microsoft.com/office/powerpoint/2010/main" val="2668980122"/>
+        <p14:creationId xmlns:p14="http://schemas.microsoft.com/office/powerpoint/2010/main" val="268889650"/>
       </p:ext>
     </p:extLst>
   </p:cSld>
@@ -636,9 +636,9 @@
           <a:bodyPr/>
           <a:lstStyle/>
           <a:p>
-            <a:fld id="{21750E80-A8F1-4F3A-B283-04984F056DAD}" type="datetimeFigureOut">
+            <a:fld id="{3CB46692-9727-46A0-A109-6F804C3C5B15}" type="datetimeFigureOut">
               <a:rPr lang="en-US" smtClean="0"/>
-              <a:t>1/11/2016</a:t>
+              <a:t>1/12/2016</a:t>
             </a:fld>
             <a:endParaRPr lang="en-US"/>
           </a:p>
@@ -678,7 +678,7 @@
           <a:bodyPr/>
           <a:lstStyle/>
           <a:p>
-            <a:fld id="{FDE6D831-7137-42F3-9A80-B0E8AA80523A}" type="slidenum">
+            <a:fld id="{432F7E23-9FC9-4871-B463-EE63CBC64C8F}" type="slidenum">
               <a:rPr lang="en-US" smtClean="0"/>
               <a:t>‹N°›</a:t>
             </a:fld>
@@ -689,7 +689,7 @@
     </p:spTree>
     <p:extLst>
       <p:ext uri="{BB962C8B-B14F-4D97-AF65-F5344CB8AC3E}">
-        <p14:creationId xmlns:p14="http://schemas.microsoft.com/office/powerpoint/2010/main" val="1992719421"/>
+        <p14:creationId xmlns:p14="http://schemas.microsoft.com/office/powerpoint/2010/main" val="1353838475"/>
       </p:ext>
     </p:extLst>
   </p:cSld>
@@ -806,9 +806,9 @@
           <a:bodyPr/>
           <a:lstStyle/>
           <a:p>
-            <a:fld id="{21750E80-A8F1-4F3A-B283-04984F056DAD}" type="datetimeFigureOut">
+            <a:fld id="{3CB46692-9727-46A0-A109-6F804C3C5B15}" type="datetimeFigureOut">
               <a:rPr lang="en-US" smtClean="0"/>
-              <a:t>1/11/2016</a:t>
+              <a:t>1/12/2016</a:t>
             </a:fld>
             <a:endParaRPr lang="en-US"/>
           </a:p>
@@ -848,7 +848,7 @@
           <a:bodyPr/>
           <a:lstStyle/>
           <a:p>
-            <a:fld id="{FDE6D831-7137-42F3-9A80-B0E8AA80523A}" type="slidenum">
+            <a:fld id="{432F7E23-9FC9-4871-B463-EE63CBC64C8F}" type="slidenum">
               <a:rPr lang="en-US" smtClean="0"/>
               <a:t>‹N°›</a:t>
             </a:fld>
@@ -859,7 +859,7 @@
     </p:spTree>
     <p:extLst>
       <p:ext uri="{BB962C8B-B14F-4D97-AF65-F5344CB8AC3E}">
-        <p14:creationId xmlns:p14="http://schemas.microsoft.com/office/powerpoint/2010/main" val="1358563674"/>
+        <p14:creationId xmlns:p14="http://schemas.microsoft.com/office/powerpoint/2010/main" val="348156579"/>
       </p:ext>
     </p:extLst>
   </p:cSld>
@@ -1052,9 +1052,9 @@
           <a:bodyPr/>
           <a:lstStyle/>
           <a:p>
-            <a:fld id="{21750E80-A8F1-4F3A-B283-04984F056DAD}" type="datetimeFigureOut">
+            <a:fld id="{3CB46692-9727-46A0-A109-6F804C3C5B15}" type="datetimeFigureOut">
               <a:rPr lang="en-US" smtClean="0"/>
-              <a:t>1/11/2016</a:t>
+              <a:t>1/12/2016</a:t>
             </a:fld>
             <a:endParaRPr lang="en-US"/>
           </a:p>
@@ -1094,7 +1094,7 @@
           <a:bodyPr/>
           <a:lstStyle/>
           <a:p>
-            <a:fld id="{FDE6D831-7137-42F3-9A80-B0E8AA80523A}" type="slidenum">
+            <a:fld id="{432F7E23-9FC9-4871-B463-EE63CBC64C8F}" type="slidenum">
               <a:rPr lang="en-US" smtClean="0"/>
               <a:t>‹N°›</a:t>
             </a:fld>
@@ -1105,7 +1105,7 @@
     </p:spTree>
     <p:extLst>
       <p:ext uri="{BB962C8B-B14F-4D97-AF65-F5344CB8AC3E}">
-        <p14:creationId xmlns:p14="http://schemas.microsoft.com/office/powerpoint/2010/main" val="3376106527"/>
+        <p14:creationId xmlns:p14="http://schemas.microsoft.com/office/powerpoint/2010/main" val="187768494"/>
       </p:ext>
     </p:extLst>
   </p:cSld>
@@ -1340,9 +1340,9 @@
           <a:bodyPr/>
           <a:lstStyle/>
           <a:p>
-            <a:fld id="{21750E80-A8F1-4F3A-B283-04984F056DAD}" type="datetimeFigureOut">
+            <a:fld id="{3CB46692-9727-46A0-A109-6F804C3C5B15}" type="datetimeFigureOut">
               <a:rPr lang="en-US" smtClean="0"/>
-              <a:t>1/11/2016</a:t>
+              <a:t>1/12/2016</a:t>
             </a:fld>
             <a:endParaRPr lang="en-US"/>
           </a:p>
@@ -1382,7 +1382,7 @@
           <a:bodyPr/>
           <a:lstStyle/>
           <a:p>
-            <a:fld id="{FDE6D831-7137-42F3-9A80-B0E8AA80523A}" type="slidenum">
+            <a:fld id="{432F7E23-9FC9-4871-B463-EE63CBC64C8F}" type="slidenum">
               <a:rPr lang="en-US" smtClean="0"/>
               <a:t>‹N°›</a:t>
             </a:fld>
@@ -1393,7 +1393,7 @@
     </p:spTree>
     <p:extLst>
       <p:ext uri="{BB962C8B-B14F-4D97-AF65-F5344CB8AC3E}">
-        <p14:creationId xmlns:p14="http://schemas.microsoft.com/office/powerpoint/2010/main" val="2221130037"/>
+        <p14:creationId xmlns:p14="http://schemas.microsoft.com/office/powerpoint/2010/main" val="2304594529"/>
       </p:ext>
     </p:extLst>
   </p:cSld>
@@ -1762,9 +1762,9 @@
           <a:bodyPr/>
           <a:lstStyle/>
           <a:p>
-            <a:fld id="{21750E80-A8F1-4F3A-B283-04984F056DAD}" type="datetimeFigureOut">
+            <a:fld id="{3CB46692-9727-46A0-A109-6F804C3C5B15}" type="datetimeFigureOut">
               <a:rPr lang="en-US" smtClean="0"/>
-              <a:t>1/11/2016</a:t>
+              <a:t>1/12/2016</a:t>
             </a:fld>
             <a:endParaRPr lang="en-US"/>
           </a:p>
@@ -1804,7 +1804,7 @@
           <a:bodyPr/>
           <a:lstStyle/>
           <a:p>
-            <a:fld id="{FDE6D831-7137-42F3-9A80-B0E8AA80523A}" type="slidenum">
+            <a:fld id="{432F7E23-9FC9-4871-B463-EE63CBC64C8F}" type="slidenum">
               <a:rPr lang="en-US" smtClean="0"/>
               <a:t>‹N°›</a:t>
             </a:fld>
@@ -1815,7 +1815,7 @@
     </p:spTree>
     <p:extLst>
       <p:ext uri="{BB962C8B-B14F-4D97-AF65-F5344CB8AC3E}">
-        <p14:creationId xmlns:p14="http://schemas.microsoft.com/office/powerpoint/2010/main" val="3091560140"/>
+        <p14:creationId xmlns:p14="http://schemas.microsoft.com/office/powerpoint/2010/main" val="521155720"/>
       </p:ext>
     </p:extLst>
   </p:cSld>
@@ -1880,9 +1880,9 @@
           <a:bodyPr/>
           <a:lstStyle/>
           <a:p>
-            <a:fld id="{21750E80-A8F1-4F3A-B283-04984F056DAD}" type="datetimeFigureOut">
+            <a:fld id="{3CB46692-9727-46A0-A109-6F804C3C5B15}" type="datetimeFigureOut">
               <a:rPr lang="en-US" smtClean="0"/>
-              <a:t>1/11/2016</a:t>
+              <a:t>1/12/2016</a:t>
             </a:fld>
             <a:endParaRPr lang="en-US"/>
           </a:p>
@@ -1922,7 +1922,7 @@
           <a:bodyPr/>
           <a:lstStyle/>
           <a:p>
-            <a:fld id="{FDE6D831-7137-42F3-9A80-B0E8AA80523A}" type="slidenum">
+            <a:fld id="{432F7E23-9FC9-4871-B463-EE63CBC64C8F}" type="slidenum">
               <a:rPr lang="en-US" smtClean="0"/>
               <a:t>‹N°›</a:t>
             </a:fld>
@@ -1933,7 +1933,7 @@
     </p:spTree>
     <p:extLst>
       <p:ext uri="{BB962C8B-B14F-4D97-AF65-F5344CB8AC3E}">
-        <p14:creationId xmlns:p14="http://schemas.microsoft.com/office/powerpoint/2010/main" val="1486723559"/>
+        <p14:creationId xmlns:p14="http://schemas.microsoft.com/office/powerpoint/2010/main" val="2917576014"/>
       </p:ext>
     </p:extLst>
   </p:cSld>
@@ -1975,9 +1975,9 @@
           <a:bodyPr/>
           <a:lstStyle/>
           <a:p>
-            <a:fld id="{21750E80-A8F1-4F3A-B283-04984F056DAD}" type="datetimeFigureOut">
+            <a:fld id="{3CB46692-9727-46A0-A109-6F804C3C5B15}" type="datetimeFigureOut">
               <a:rPr lang="en-US" smtClean="0"/>
-              <a:t>1/11/2016</a:t>
+              <a:t>1/12/2016</a:t>
             </a:fld>
             <a:endParaRPr lang="en-US"/>
           </a:p>
@@ -2017,7 +2017,7 @@
           <a:bodyPr/>
           <a:lstStyle/>
           <a:p>
-            <a:fld id="{FDE6D831-7137-42F3-9A80-B0E8AA80523A}" type="slidenum">
+            <a:fld id="{432F7E23-9FC9-4871-B463-EE63CBC64C8F}" type="slidenum">
               <a:rPr lang="en-US" smtClean="0"/>
               <a:t>‹N°›</a:t>
             </a:fld>
@@ -2028,7 +2028,7 @@
     </p:spTree>
     <p:extLst>
       <p:ext uri="{BB962C8B-B14F-4D97-AF65-F5344CB8AC3E}">
-        <p14:creationId xmlns:p14="http://schemas.microsoft.com/office/powerpoint/2010/main" val="2475580652"/>
+        <p14:creationId xmlns:p14="http://schemas.microsoft.com/office/powerpoint/2010/main" val="4162844689"/>
       </p:ext>
     </p:extLst>
   </p:cSld>
@@ -2252,9 +2252,9 @@
           <a:bodyPr/>
           <a:lstStyle/>
           <a:p>
-            <a:fld id="{21750E80-A8F1-4F3A-B283-04984F056DAD}" type="datetimeFigureOut">
+            <a:fld id="{3CB46692-9727-46A0-A109-6F804C3C5B15}" type="datetimeFigureOut">
               <a:rPr lang="en-US" smtClean="0"/>
-              <a:t>1/11/2016</a:t>
+              <a:t>1/12/2016</a:t>
             </a:fld>
             <a:endParaRPr lang="en-US"/>
           </a:p>
@@ -2294,7 +2294,7 @@
           <a:bodyPr/>
           <a:lstStyle/>
           <a:p>
-            <a:fld id="{FDE6D831-7137-42F3-9A80-B0E8AA80523A}" type="slidenum">
+            <a:fld id="{432F7E23-9FC9-4871-B463-EE63CBC64C8F}" type="slidenum">
               <a:rPr lang="en-US" smtClean="0"/>
               <a:t>‹N°›</a:t>
             </a:fld>
@@ -2305,7 +2305,7 @@
     </p:spTree>
     <p:extLst>
       <p:ext uri="{BB962C8B-B14F-4D97-AF65-F5344CB8AC3E}">
-        <p14:creationId xmlns:p14="http://schemas.microsoft.com/office/powerpoint/2010/main" val="2081386804"/>
+        <p14:creationId xmlns:p14="http://schemas.microsoft.com/office/powerpoint/2010/main" val="4266807022"/>
       </p:ext>
     </p:extLst>
   </p:cSld>
@@ -2505,9 +2505,9 @@
           <a:bodyPr/>
           <a:lstStyle/>
           <a:p>
-            <a:fld id="{21750E80-A8F1-4F3A-B283-04984F056DAD}" type="datetimeFigureOut">
+            <a:fld id="{3CB46692-9727-46A0-A109-6F804C3C5B15}" type="datetimeFigureOut">
               <a:rPr lang="en-US" smtClean="0"/>
-              <a:t>1/11/2016</a:t>
+              <a:t>1/12/2016</a:t>
             </a:fld>
             <a:endParaRPr lang="en-US"/>
           </a:p>
@@ -2547,7 +2547,7 @@
           <a:bodyPr/>
           <a:lstStyle/>
           <a:p>
-            <a:fld id="{FDE6D831-7137-42F3-9A80-B0E8AA80523A}" type="slidenum">
+            <a:fld id="{432F7E23-9FC9-4871-B463-EE63CBC64C8F}" type="slidenum">
               <a:rPr lang="en-US" smtClean="0"/>
               <a:t>‹N°›</a:t>
             </a:fld>
@@ -2558,7 +2558,7 @@
     </p:spTree>
     <p:extLst>
       <p:ext uri="{BB962C8B-B14F-4D97-AF65-F5344CB8AC3E}">
-        <p14:creationId xmlns:p14="http://schemas.microsoft.com/office/powerpoint/2010/main" val="1024824115"/>
+        <p14:creationId xmlns:p14="http://schemas.microsoft.com/office/powerpoint/2010/main" val="4219131263"/>
       </p:ext>
     </p:extLst>
   </p:cSld>
@@ -2718,9 +2718,9 @@
             </a:lvl1pPr>
           </a:lstStyle>
           <a:p>
-            <a:fld id="{21750E80-A8F1-4F3A-B283-04984F056DAD}" type="datetimeFigureOut">
+            <a:fld id="{3CB46692-9727-46A0-A109-6F804C3C5B15}" type="datetimeFigureOut">
               <a:rPr lang="en-US" smtClean="0"/>
-              <a:t>1/11/2016</a:t>
+              <a:t>1/12/2016</a:t>
             </a:fld>
             <a:endParaRPr lang="en-US"/>
           </a:p>
@@ -2796,7 +2796,7 @@
             </a:lvl1pPr>
           </a:lstStyle>
           <a:p>
-            <a:fld id="{FDE6D831-7137-42F3-9A80-B0E8AA80523A}" type="slidenum">
+            <a:fld id="{432F7E23-9FC9-4871-B463-EE63CBC64C8F}" type="slidenum">
               <a:rPr lang="en-US" smtClean="0"/>
               <a:t>‹N°›</a:t>
             </a:fld>
@@ -2807,7 +2807,7 @@
     </p:spTree>
     <p:extLst>
       <p:ext uri="{BB962C8B-B14F-4D97-AF65-F5344CB8AC3E}">
-        <p14:creationId xmlns:p14="http://schemas.microsoft.com/office/powerpoint/2010/main" val="2514907131"/>
+        <p14:creationId xmlns:p14="http://schemas.microsoft.com/office/powerpoint/2010/main" val="585254044"/>
       </p:ext>
     </p:extLst>
   </p:cSld>
@@ -3095,9 +3095,47 @@
           <a:chExt cx="0" cy="0"/>
         </a:xfrm>
       </p:grpSpPr>
+      <p:sp>
+        <p:nvSpPr>
+          <p:cNvPr id="2" name="Titre 1"/>
+          <p:cNvSpPr>
+            <a:spLocks noGrp="1"/>
+          </p:cNvSpPr>
+          <p:nvPr>
+            <p:ph type="ctrTitle"/>
+          </p:nvPr>
+        </p:nvSpPr>
+        <p:spPr/>
+        <p:txBody>
+          <a:bodyPr/>
+          <a:lstStyle/>
+          <a:p>
+            <a:endParaRPr lang="en-US"/>
+          </a:p>
+        </p:txBody>
+      </p:sp>
+      <p:sp>
+        <p:nvSpPr>
+          <p:cNvPr id="3" name="Sous-titre 2"/>
+          <p:cNvSpPr>
+            <a:spLocks noGrp="1"/>
+          </p:cNvSpPr>
+          <p:nvPr>
+            <p:ph type="subTitle" idx="1"/>
+          </p:nvPr>
+        </p:nvSpPr>
+        <p:spPr/>
+        <p:txBody>
+          <a:bodyPr/>
+          <a:lstStyle/>
+          <a:p>
+            <a:endParaRPr lang="en-US"/>
+          </a:p>
+        </p:txBody>
+      </p:sp>
       <p:pic>
         <p:nvPicPr>
-          <p:cNvPr id="10" name="Image 9"/>
+          <p:cNvPr id="4" name="Image 3"/>
           <p:cNvPicPr>
             <a:picLocks noChangeAspect="1"/>
           </p:cNvPicPr>
@@ -3117,466 +3155,23 @@
         </p:blipFill>
         <p:spPr>
           <a:xfrm>
-            <a:off x="0" y="1862146"/>
-            <a:ext cx="9144000" cy="3133708"/>
+            <a:off x="0" y="1179478"/>
+            <a:ext cx="9144000" cy="4499043"/>
           </a:xfrm>
           <a:prstGeom prst="rect">
             <a:avLst/>
           </a:prstGeom>
         </p:spPr>
       </p:pic>
-      <p:sp>
-        <p:nvSpPr>
-          <p:cNvPr id="13" name="Rectangle 12"/>
-          <p:cNvSpPr/>
-          <p:nvPr/>
-        </p:nvSpPr>
-        <p:spPr>
-          <a:xfrm>
-            <a:off x="107504" y="4509120"/>
-            <a:ext cx="1080120" cy="360040"/>
-          </a:xfrm>
-          <a:prstGeom prst="rect">
-            <a:avLst/>
-          </a:prstGeom>
-          <a:noFill/>
-          <a:ln>
-            <a:noFill/>
-          </a:ln>
-        </p:spPr>
-        <p:style>
-          <a:lnRef idx="2">
-            <a:schemeClr val="accent1">
-              <a:shade val="50000"/>
-            </a:schemeClr>
-          </a:lnRef>
-          <a:fillRef idx="1">
-            <a:schemeClr val="accent1"/>
-          </a:fillRef>
-          <a:effectRef idx="0">
-            <a:schemeClr val="accent1"/>
-          </a:effectRef>
-          <a:fontRef idx="minor">
-            <a:schemeClr val="lt1"/>
-          </a:fontRef>
-        </p:style>
-        <p:txBody>
-          <a:bodyPr rtlCol="0" anchor="ctr"/>
-          <a:lstStyle/>
-          <a:p>
-            <a:pPr algn="ctr"/>
-            <a:endParaRPr lang="en-US"/>
-          </a:p>
-        </p:txBody>
-      </p:sp>
-      <p:sp>
-        <p:nvSpPr>
-          <p:cNvPr id="14" name="Rectangle 13"/>
-          <p:cNvSpPr/>
-          <p:nvPr/>
-        </p:nvSpPr>
-        <p:spPr>
-          <a:xfrm>
-            <a:off x="1331640" y="4509120"/>
-            <a:ext cx="1080120" cy="360040"/>
-          </a:xfrm>
-          <a:prstGeom prst="rect">
-            <a:avLst/>
-          </a:prstGeom>
-          <a:noFill/>
-          <a:ln>
-            <a:noFill/>
-          </a:ln>
-        </p:spPr>
-        <p:style>
-          <a:lnRef idx="2">
-            <a:schemeClr val="accent1">
-              <a:shade val="50000"/>
-            </a:schemeClr>
-          </a:lnRef>
-          <a:fillRef idx="1">
-            <a:schemeClr val="accent1"/>
-          </a:fillRef>
-          <a:effectRef idx="0">
-            <a:schemeClr val="accent1"/>
-          </a:effectRef>
-          <a:fontRef idx="minor">
-            <a:schemeClr val="lt1"/>
-          </a:fontRef>
-        </p:style>
-        <p:txBody>
-          <a:bodyPr rtlCol="0" anchor="ctr"/>
-          <a:lstStyle/>
-          <a:p>
-            <a:pPr algn="ctr"/>
-            <a:endParaRPr lang="en-US"/>
-          </a:p>
-        </p:txBody>
-      </p:sp>
-      <p:sp>
-        <p:nvSpPr>
-          <p:cNvPr id="15" name="Rectangle 14"/>
-          <p:cNvSpPr/>
-          <p:nvPr/>
-        </p:nvSpPr>
-        <p:spPr>
-          <a:xfrm>
-            <a:off x="2627784" y="4509120"/>
-            <a:ext cx="1080120" cy="360040"/>
-          </a:xfrm>
-          <a:prstGeom prst="rect">
-            <a:avLst/>
-          </a:prstGeom>
-          <a:noFill/>
-          <a:ln>
-            <a:noFill/>
-          </a:ln>
-        </p:spPr>
-        <p:style>
-          <a:lnRef idx="2">
-            <a:schemeClr val="accent1">
-              <a:shade val="50000"/>
-            </a:schemeClr>
-          </a:lnRef>
-          <a:fillRef idx="1">
-            <a:schemeClr val="accent1"/>
-          </a:fillRef>
-          <a:effectRef idx="0">
-            <a:schemeClr val="accent1"/>
-          </a:effectRef>
-          <a:fontRef idx="minor">
-            <a:schemeClr val="lt1"/>
-          </a:fontRef>
-        </p:style>
-        <p:txBody>
-          <a:bodyPr rtlCol="0" anchor="ctr"/>
-          <a:lstStyle/>
-          <a:p>
-            <a:pPr algn="ctr"/>
-            <a:endParaRPr lang="en-US"/>
-          </a:p>
-        </p:txBody>
-      </p:sp>
-      <p:sp>
-        <p:nvSpPr>
-          <p:cNvPr id="16" name="Rectangle 15"/>
-          <p:cNvSpPr/>
-          <p:nvPr/>
-        </p:nvSpPr>
-        <p:spPr>
-          <a:xfrm>
-            <a:off x="4031940" y="4511960"/>
-            <a:ext cx="1080120" cy="360040"/>
-          </a:xfrm>
-          <a:prstGeom prst="rect">
-            <a:avLst/>
-          </a:prstGeom>
-          <a:noFill/>
-          <a:ln>
-            <a:noFill/>
-          </a:ln>
-        </p:spPr>
-        <p:style>
-          <a:lnRef idx="2">
-            <a:schemeClr val="accent1">
-              <a:shade val="50000"/>
-            </a:schemeClr>
-          </a:lnRef>
-          <a:fillRef idx="1">
-            <a:schemeClr val="accent1"/>
-          </a:fillRef>
-          <a:effectRef idx="0">
-            <a:schemeClr val="accent1"/>
-          </a:effectRef>
-          <a:fontRef idx="minor">
-            <a:schemeClr val="lt1"/>
-          </a:fontRef>
-        </p:style>
-        <p:txBody>
-          <a:bodyPr rtlCol="0" anchor="ctr"/>
-          <a:lstStyle/>
-          <a:p>
-            <a:pPr algn="ctr"/>
-            <a:endParaRPr lang="en-US"/>
-          </a:p>
-        </p:txBody>
-      </p:sp>
-      <p:sp>
-        <p:nvSpPr>
-          <p:cNvPr id="17" name="Rectangle 16"/>
-          <p:cNvSpPr/>
-          <p:nvPr/>
-        </p:nvSpPr>
-        <p:spPr>
-          <a:xfrm>
-            <a:off x="5292080" y="4522988"/>
-            <a:ext cx="1080120" cy="360040"/>
-          </a:xfrm>
-          <a:prstGeom prst="rect">
-            <a:avLst/>
-          </a:prstGeom>
-          <a:noFill/>
-          <a:ln>
-            <a:noFill/>
-          </a:ln>
-        </p:spPr>
-        <p:style>
-          <a:lnRef idx="2">
-            <a:schemeClr val="accent1">
-              <a:shade val="50000"/>
-            </a:schemeClr>
-          </a:lnRef>
-          <a:fillRef idx="1">
-            <a:schemeClr val="accent1"/>
-          </a:fillRef>
-          <a:effectRef idx="0">
-            <a:schemeClr val="accent1"/>
-          </a:effectRef>
-          <a:fontRef idx="minor">
-            <a:schemeClr val="lt1"/>
-          </a:fontRef>
-        </p:style>
-        <p:txBody>
-          <a:bodyPr rtlCol="0" anchor="ctr"/>
-          <a:lstStyle/>
-          <a:p>
-            <a:pPr algn="ctr"/>
-            <a:endParaRPr lang="en-US"/>
-          </a:p>
-        </p:txBody>
-      </p:sp>
-      <p:sp>
-        <p:nvSpPr>
-          <p:cNvPr id="18" name="Rectangle 17"/>
-          <p:cNvSpPr/>
-          <p:nvPr/>
-        </p:nvSpPr>
-        <p:spPr>
-          <a:xfrm>
-            <a:off x="6660232" y="4522988"/>
-            <a:ext cx="1080120" cy="360040"/>
-          </a:xfrm>
-          <a:prstGeom prst="rect">
-            <a:avLst/>
-          </a:prstGeom>
-          <a:noFill/>
-          <a:ln>
-            <a:noFill/>
-          </a:ln>
-        </p:spPr>
-        <p:style>
-          <a:lnRef idx="2">
-            <a:schemeClr val="accent1">
-              <a:shade val="50000"/>
-            </a:schemeClr>
-          </a:lnRef>
-          <a:fillRef idx="1">
-            <a:schemeClr val="accent1"/>
-          </a:fillRef>
-          <a:effectRef idx="0">
-            <a:schemeClr val="accent1"/>
-          </a:effectRef>
-          <a:fontRef idx="minor">
-            <a:schemeClr val="lt1"/>
-          </a:fontRef>
-        </p:style>
-        <p:txBody>
-          <a:bodyPr rtlCol="0" anchor="ctr"/>
-          <a:lstStyle/>
-          <a:p>
-            <a:pPr algn="ctr"/>
-            <a:endParaRPr lang="en-US"/>
-          </a:p>
-        </p:txBody>
-      </p:sp>
-      <p:sp>
-        <p:nvSpPr>
-          <p:cNvPr id="19" name="Rectangle 18"/>
-          <p:cNvSpPr/>
-          <p:nvPr/>
-        </p:nvSpPr>
-        <p:spPr>
-          <a:xfrm>
-            <a:off x="7956376" y="4530588"/>
-            <a:ext cx="1080120" cy="360040"/>
-          </a:xfrm>
-          <a:prstGeom prst="rect">
-            <a:avLst/>
-          </a:prstGeom>
-          <a:noFill/>
-          <a:ln>
-            <a:noFill/>
-          </a:ln>
-        </p:spPr>
-        <p:style>
-          <a:lnRef idx="2">
-            <a:schemeClr val="accent1">
-              <a:shade val="50000"/>
-            </a:schemeClr>
-          </a:lnRef>
-          <a:fillRef idx="1">
-            <a:schemeClr val="accent1"/>
-          </a:fillRef>
-          <a:effectRef idx="0">
-            <a:schemeClr val="accent1"/>
-          </a:effectRef>
-          <a:fontRef idx="minor">
-            <a:schemeClr val="lt1"/>
-          </a:fontRef>
-        </p:style>
-        <p:txBody>
-          <a:bodyPr rtlCol="0" anchor="ctr"/>
-          <a:lstStyle/>
-          <a:p>
-            <a:pPr algn="ctr"/>
-            <a:endParaRPr lang="en-US"/>
-          </a:p>
-        </p:txBody>
-      </p:sp>
-      <p:sp>
-        <p:nvSpPr>
-          <p:cNvPr id="20" name="Rectangle 19"/>
-          <p:cNvSpPr/>
-          <p:nvPr/>
-        </p:nvSpPr>
-        <p:spPr>
-          <a:xfrm>
-            <a:off x="755576" y="3140968"/>
-            <a:ext cx="1008112" cy="864096"/>
-          </a:xfrm>
-          <a:prstGeom prst="rect">
-            <a:avLst/>
-          </a:prstGeom>
-          <a:noFill/>
-          <a:ln>
-            <a:noFill/>
-          </a:ln>
-        </p:spPr>
-        <p:style>
-          <a:lnRef idx="2">
-            <a:schemeClr val="accent1">
-              <a:shade val="50000"/>
-            </a:schemeClr>
-          </a:lnRef>
-          <a:fillRef idx="1">
-            <a:schemeClr val="accent1"/>
-          </a:fillRef>
-          <a:effectRef idx="0">
-            <a:schemeClr val="accent1"/>
-          </a:effectRef>
-          <a:fontRef idx="minor">
-            <a:schemeClr val="lt1"/>
-          </a:fontRef>
-        </p:style>
-        <p:txBody>
-          <a:bodyPr rtlCol="0" anchor="ctr"/>
-          <a:lstStyle/>
-          <a:p>
-            <a:pPr algn="ctr"/>
-            <a:endParaRPr lang="en-US"/>
-          </a:p>
-        </p:txBody>
-      </p:sp>
-      <p:sp>
-        <p:nvSpPr>
-          <p:cNvPr id="22" name="Rectangle 21"/>
-          <p:cNvSpPr/>
-          <p:nvPr/>
-        </p:nvSpPr>
-        <p:spPr>
-          <a:xfrm>
-            <a:off x="4644008" y="3140968"/>
-            <a:ext cx="1008112" cy="864096"/>
-          </a:xfrm>
-          <a:prstGeom prst="rect">
-            <a:avLst/>
-          </a:prstGeom>
-          <a:noFill/>
-          <a:ln>
-            <a:noFill/>
-          </a:ln>
-        </p:spPr>
-        <p:style>
-          <a:lnRef idx="2">
-            <a:schemeClr val="accent1">
-              <a:shade val="50000"/>
-            </a:schemeClr>
-          </a:lnRef>
-          <a:fillRef idx="1">
-            <a:schemeClr val="accent1"/>
-          </a:fillRef>
-          <a:effectRef idx="0">
-            <a:schemeClr val="accent1"/>
-          </a:effectRef>
-          <a:fontRef idx="minor">
-            <a:schemeClr val="lt1"/>
-          </a:fontRef>
-        </p:style>
-        <p:txBody>
-          <a:bodyPr rtlCol="0" anchor="ctr"/>
-          <a:lstStyle/>
-          <a:p>
-            <a:pPr algn="ctr"/>
-            <a:endParaRPr lang="en-US"/>
-          </a:p>
-        </p:txBody>
-      </p:sp>
-      <p:sp>
-        <p:nvSpPr>
-          <p:cNvPr id="23" name="Rectangle 22"/>
-          <p:cNvSpPr/>
-          <p:nvPr/>
-        </p:nvSpPr>
-        <p:spPr>
-          <a:xfrm>
-            <a:off x="7308304" y="3108960"/>
-            <a:ext cx="1008112" cy="864096"/>
-          </a:xfrm>
-          <a:prstGeom prst="rect">
-            <a:avLst/>
-          </a:prstGeom>
-          <a:noFill/>
-          <a:ln>
-            <a:noFill/>
-          </a:ln>
-        </p:spPr>
-        <p:style>
-          <a:lnRef idx="2">
-            <a:schemeClr val="accent1">
-              <a:shade val="50000"/>
-            </a:schemeClr>
-          </a:lnRef>
-          <a:fillRef idx="1">
-            <a:schemeClr val="accent1"/>
-          </a:fillRef>
-          <a:effectRef idx="0">
-            <a:schemeClr val="accent1"/>
-          </a:effectRef>
-          <a:fontRef idx="minor">
-            <a:schemeClr val="lt1"/>
-          </a:fontRef>
-        </p:style>
-        <p:txBody>
-          <a:bodyPr rtlCol="0" anchor="ctr"/>
-          <a:lstStyle/>
-          <a:p>
-            <a:pPr algn="ctr"/>
-            <a:endParaRPr lang="en-US"/>
-          </a:p>
-        </p:txBody>
-      </p:sp>
       <p:cxnSp>
         <p:nvCxnSpPr>
-          <p:cNvPr id="28" name="Connecteur droit avec flèche 27"/>
-          <p:cNvCxnSpPr>
-            <a:stCxn id="13" idx="0"/>
-            <a:endCxn id="20" idx="2"/>
-          </p:cNvCxnSpPr>
+          <p:cNvPr id="5" name="Connecteur droit avec flèche 4"/>
+          <p:cNvCxnSpPr/>
           <p:nvPr/>
         </p:nvCxnSpPr>
         <p:spPr>
           <a:xfrm flipV="1">
-            <a:off x="647564" y="4005064"/>
+            <a:off x="647564" y="4685144"/>
             <a:ext cx="612068" cy="504056"/>
           </a:xfrm>
           <a:prstGeom prst="straightConnector1">
@@ -3603,16 +3198,13 @@
       </p:cxnSp>
       <p:cxnSp>
         <p:nvCxnSpPr>
-          <p:cNvPr id="30" name="Connecteur droit avec flèche 29"/>
-          <p:cNvCxnSpPr>
-            <a:stCxn id="14" idx="0"/>
-            <a:endCxn id="20" idx="2"/>
-          </p:cNvCxnSpPr>
+          <p:cNvPr id="6" name="Connecteur droit avec flèche 5"/>
+          <p:cNvCxnSpPr/>
           <p:nvPr/>
         </p:nvCxnSpPr>
         <p:spPr>
           <a:xfrm flipH="1" flipV="1">
-            <a:off x="1259632" y="4005064"/>
+            <a:off x="1259632" y="4685144"/>
             <a:ext cx="612068" cy="504056"/>
           </a:xfrm>
           <a:prstGeom prst="straightConnector1">
@@ -3639,16 +3231,13 @@
       </p:cxnSp>
       <p:cxnSp>
         <p:nvCxnSpPr>
-          <p:cNvPr id="36" name="Connecteur droit avec flèche 35"/>
-          <p:cNvCxnSpPr>
-            <a:stCxn id="16" idx="0"/>
-            <a:endCxn id="22" idx="2"/>
-          </p:cNvCxnSpPr>
+          <p:cNvPr id="7" name="Connecteur droit avec flèche 6"/>
+          <p:cNvCxnSpPr/>
           <p:nvPr/>
         </p:nvCxnSpPr>
         <p:spPr>
           <a:xfrm flipV="1">
-            <a:off x="4572000" y="4005064"/>
+            <a:off x="4572000" y="4685144"/>
             <a:ext cx="576064" cy="506896"/>
           </a:xfrm>
           <a:prstGeom prst="straightConnector1">
@@ -3675,16 +3264,13 @@
       </p:cxnSp>
       <p:cxnSp>
         <p:nvCxnSpPr>
-          <p:cNvPr id="38" name="Connecteur droit avec flèche 37"/>
-          <p:cNvCxnSpPr>
-            <a:stCxn id="17" idx="0"/>
-            <a:endCxn id="22" idx="2"/>
-          </p:cNvCxnSpPr>
+          <p:cNvPr id="8" name="Connecteur droit avec flèche 7"/>
+          <p:cNvCxnSpPr/>
           <p:nvPr/>
         </p:nvCxnSpPr>
         <p:spPr>
           <a:xfrm flipH="1" flipV="1">
-            <a:off x="5148064" y="4005064"/>
+            <a:off x="5148064" y="4685144"/>
             <a:ext cx="684076" cy="517924"/>
           </a:xfrm>
           <a:prstGeom prst="straightConnector1">
@@ -3711,16 +3297,13 @@
       </p:cxnSp>
       <p:cxnSp>
         <p:nvCxnSpPr>
-          <p:cNvPr id="40" name="Connecteur droit avec flèche 39"/>
-          <p:cNvCxnSpPr>
-            <a:stCxn id="18" idx="0"/>
-            <a:endCxn id="23" idx="2"/>
-          </p:cNvCxnSpPr>
+          <p:cNvPr id="9" name="Connecteur droit avec flèche 8"/>
+          <p:cNvCxnSpPr/>
           <p:nvPr/>
         </p:nvCxnSpPr>
         <p:spPr>
           <a:xfrm flipV="1">
-            <a:off x="7200292" y="3973056"/>
+            <a:off x="7200292" y="4653136"/>
             <a:ext cx="612068" cy="549932"/>
           </a:xfrm>
           <a:prstGeom prst="straightConnector1">
@@ -3747,15 +3330,13 @@
       </p:cxnSp>
       <p:cxnSp>
         <p:nvCxnSpPr>
-          <p:cNvPr id="42" name="Connecteur droit avec flèche 41"/>
-          <p:cNvCxnSpPr>
-            <a:stCxn id="19" idx="0"/>
-          </p:cNvCxnSpPr>
+          <p:cNvPr id="10" name="Connecteur droit avec flèche 9"/>
+          <p:cNvCxnSpPr/>
           <p:nvPr/>
         </p:nvCxnSpPr>
         <p:spPr>
           <a:xfrm flipH="1" flipV="1">
-            <a:off x="7812360" y="3973056"/>
+            <a:off x="7812360" y="4653136"/>
             <a:ext cx="684076" cy="557532"/>
           </a:xfrm>
           <a:prstGeom prst="straightConnector1">
@@ -3782,15 +3363,13 @@
       </p:cxnSp>
       <p:cxnSp>
         <p:nvCxnSpPr>
-          <p:cNvPr id="44" name="Connecteur droit avec flèche 43"/>
-          <p:cNvCxnSpPr>
-            <a:stCxn id="15" idx="0"/>
-          </p:cNvCxnSpPr>
+          <p:cNvPr id="11" name="Connecteur droit avec flèche 10"/>
+          <p:cNvCxnSpPr/>
           <p:nvPr/>
         </p:nvCxnSpPr>
         <p:spPr>
           <a:xfrm flipV="1">
-            <a:off x="3167844" y="4005064"/>
+            <a:off x="3167844" y="4685144"/>
             <a:ext cx="0" cy="504056"/>
           </a:xfrm>
           <a:prstGeom prst="straightConnector1">
@@ -3817,13 +3396,13 @@
       </p:cxnSp>
       <p:cxnSp>
         <p:nvCxnSpPr>
-          <p:cNvPr id="45" name="Connecteur droit avec flèche 44"/>
+          <p:cNvPr id="12" name="Connecteur droit avec flèche 11"/>
           <p:cNvCxnSpPr/>
           <p:nvPr/>
         </p:nvCxnSpPr>
         <p:spPr>
           <a:xfrm>
-            <a:off x="107504" y="2060848"/>
+            <a:off x="76666" y="1691516"/>
             <a:ext cx="332420" cy="0"/>
           </a:xfrm>
           <a:prstGeom prst="straightConnector1">
@@ -3850,13 +3429,13 @@
       </p:cxnSp>
       <p:sp>
         <p:nvSpPr>
-          <p:cNvPr id="47" name="ZoneTexte 46"/>
+          <p:cNvPr id="13" name="ZoneTexte 12"/>
           <p:cNvSpPr txBox="1"/>
           <p:nvPr/>
         </p:nvSpPr>
         <p:spPr>
           <a:xfrm>
-            <a:off x="470626" y="1862146"/>
+            <a:off x="439788" y="1492814"/>
             <a:ext cx="685316" cy="369332"/>
           </a:xfrm>
           <a:prstGeom prst="rect">
@@ -3881,7 +3460,7 @@
     </p:spTree>
     <p:extLst>
       <p:ext uri="{BB962C8B-B14F-4D97-AF65-F5344CB8AC3E}">
-        <p14:creationId xmlns:p14="http://schemas.microsoft.com/office/powerpoint/2010/main" val="2526877843"/>
+        <p14:creationId xmlns:p14="http://schemas.microsoft.com/office/powerpoint/2010/main" val="3709714029"/>
       </p:ext>
     </p:extLst>
   </p:cSld>

</xml_diff>